<commit_message>
update notes and add control system presentation
</commit_message>
<xml_diff>
--- a/rsc/control-system.pptx
+++ b/rsc/control-system.pptx
@@ -6,6 +6,10 @@
   </p:sldMasterIdLst>
   <p:sldIdLst>
     <p:sldId id="256" r:id="rId3"/>
+    <p:sldId id="257" r:id="rId4"/>
+    <p:sldId id="258" r:id="rId5"/>
+    <p:sldId id="259" r:id="rId6"/>
+    <p:sldId id="260" r:id="rId7"/>
   </p:sldIdLst>
   <p:sldSz cx="10080625" cy="5670550"/>
   <p:notesSz cx="7772400" cy="10058400"/>
@@ -63,7 +67,7 @@
         <p:txBody>
           <a:bodyPr/>
           <a:p>
-            <a:fld id="{F8CADBE2-AD81-45AC-8295-9EDA4561B2FA}" type="slidenum">
+            <a:fld id="{16AE6ADE-2F46-48E8-85FB-167BD895EABB}" type="slidenum">
               <a:t>&lt;#&gt;</a:t>
             </a:fld>
           </a:p>
@@ -272,7 +276,7 @@
         <p:txBody>
           <a:bodyPr/>
           <a:p>
-            <a:fld id="{E80D8360-FB90-4D19-8575-EBC1A314FDF6}" type="slidenum">
+            <a:fld id="{B4BE7647-EE24-432D-BFF5-CF2EE82CC61B}" type="slidenum">
               <a:t>&lt;#&gt;</a:t>
             </a:fld>
           </a:p>
@@ -567,7 +571,7 @@
         <p:txBody>
           <a:bodyPr/>
           <a:p>
-            <a:fld id="{285BAB53-B15F-4D11-BA94-DC1EBB42695B}" type="slidenum">
+            <a:fld id="{803C76D6-9A24-4B1B-B806-81BB68959CB8}" type="slidenum">
               <a:t>&lt;#&gt;</a:t>
             </a:fld>
           </a:p>
@@ -948,7 +952,7 @@
         <p:txBody>
           <a:bodyPr/>
           <a:p>
-            <a:fld id="{37AFE17B-900C-4DA4-997A-49B62C42D263}" type="slidenum">
+            <a:fld id="{27FD06F9-891B-4F6C-8543-F656C44415CD}" type="slidenum">
               <a:t>&lt;#&gt;</a:t>
             </a:fld>
           </a:p>
@@ -1111,7 +1115,7 @@
         <p:txBody>
           <a:bodyPr/>
           <a:p>
-            <a:fld id="{3059B45A-0EBD-4011-82FB-1E64B50163E4}" type="slidenum">
+            <a:fld id="{0C9C1665-F41E-4369-A476-4EE83F2E50F3}" type="slidenum">
               <a:t>&lt;#&gt;</a:t>
             </a:fld>
           </a:p>
@@ -1277,7 +1281,7 @@
         <p:txBody>
           <a:bodyPr/>
           <a:p>
-            <a:fld id="{0BEFF040-2A98-42E9-ACD9-4BBD90B47D45}" type="slidenum">
+            <a:fld id="{698B823B-3745-4BF0-9BB7-C94CF8C9C2B7}" type="slidenum">
               <a:t>&lt;#&gt;</a:t>
             </a:fld>
           </a:p>
@@ -1486,7 +1490,7 @@
         <p:txBody>
           <a:bodyPr/>
           <a:p>
-            <a:fld id="{26E80918-BC0F-473B-B43D-1FD67740B93C}" type="slidenum">
+            <a:fld id="{199115F4-F2D1-4480-A0CA-B12F3F6BC70C}" type="slidenum">
               <a:t>&lt;#&gt;</a:t>
             </a:fld>
           </a:p>
@@ -1609,7 +1613,7 @@
         <p:txBody>
           <a:bodyPr/>
           <a:p>
-            <a:fld id="{CBF84149-3E8B-4DBC-A105-4DEADD9B3B03}" type="slidenum">
+            <a:fld id="{41581C9A-47DF-41D0-90EC-78B12BAFE491}" type="slidenum">
               <a:t>&lt;#&gt;</a:t>
             </a:fld>
           </a:p>
@@ -1730,7 +1734,7 @@
         <p:txBody>
           <a:bodyPr/>
           <a:p>
-            <a:fld id="{357107B9-0160-4913-AF12-B3A76F0E07D0}" type="slidenum">
+            <a:fld id="{99582BB1-9470-44EC-8C1B-C43950E1BF30}" type="slidenum">
               <a:t>&lt;#&gt;</a:t>
             </a:fld>
           </a:p>
@@ -1982,7 +1986,7 @@
         <p:txBody>
           <a:bodyPr/>
           <a:p>
-            <a:fld id="{30D6C050-934A-4841-BD0F-2F789CAC10BD}" type="slidenum">
+            <a:fld id="{BF3F62B3-AD37-4D17-8DD6-B28CE4CA95FD}" type="slidenum">
               <a:t>&lt;#&gt;</a:t>
             </a:fld>
           </a:p>
@@ -2234,7 +2238,7 @@
         <p:txBody>
           <a:bodyPr/>
           <a:p>
-            <a:fld id="{7FE8C39F-4BAC-409C-8959-D80279170589}" type="slidenum">
+            <a:fld id="{A89957D0-988E-42A5-A979-B11F84B16B27}" type="slidenum">
               <a:t>&lt;#&gt;</a:t>
             </a:fld>
           </a:p>
@@ -2486,7 +2490,7 @@
         <p:txBody>
           <a:bodyPr/>
           <a:p>
-            <a:fld id="{C9400C80-F6F3-4122-88EC-EB6A6190EDA7}" type="slidenum">
+            <a:fld id="{4E0E64FD-3363-413B-B81D-CDDF17237F40}" type="slidenum">
               <a:t>&lt;#&gt;</a:t>
             </a:fld>
           </a:p>
@@ -2971,7 +2975,7 @@
             <a:pPr indent="0" algn="r">
               <a:buNone/>
             </a:pPr>
-            <a:fld id="{6E38ECDF-443A-44DB-B7D2-FE42797F36CD}" type="slidenum">
+            <a:fld id="{BD3E8F61-A106-47F7-871E-9680F514FFEE}" type="slidenum">
               <a:rPr b="0" lang="en-US" sz="1400" spc="-1" strike="noStrike">
                 <a:solidFill>
                   <a:srgbClr val="000000"/>
@@ -3045,6 +3049,461 @@
         </p:nvSpPr>
         <p:spPr>
           <a:xfrm>
+            <a:off x="504360" y="1190880"/>
+            <a:ext cx="9071640" cy="3288240"/>
+          </a:xfrm>
+          <a:prstGeom prst="rect">
+            <a:avLst/>
+          </a:prstGeom>
+          <a:noFill/>
+          <a:ln w="0">
+            <a:noFill/>
+          </a:ln>
+        </p:spPr>
+        <p:txBody>
+          <a:bodyPr lIns="0" rIns="0" tIns="0" bIns="0" anchor="ctr">
+            <a:noAutofit/>
+          </a:bodyPr>
+          <a:p>
+            <a:pPr algn="ctr"/>
+            <a:r>
+              <a:rPr b="0" lang="en-US" sz="4200" spc="-1" strike="noStrike">
+                <a:solidFill>
+                  <a:srgbClr val="ffffff"/>
+                </a:solidFill>
+                <a:latin typeface="Bitstream Vera Sans"/>
+              </a:rPr>
+              <a:t>FRC Control System</a:t>
+            </a:r>
+            <a:endParaRPr b="0" lang="en-US" sz="4200" spc="-1" strike="noStrike">
+              <a:solidFill>
+                <a:srgbClr val="ffffff"/>
+              </a:solidFill>
+              <a:latin typeface="Bitstream Vera Sans"/>
+            </a:endParaRPr>
+          </a:p>
+        </p:txBody>
+      </p:sp>
+    </p:spTree>
+  </p:cSld>
+  <mc:AlternateContent>
+    <mc:Choice Requires="p14">
+      <p:transition spd="slow" p14:dur="2000"/>
+    </mc:Choice>
+    <mc:Fallback>
+      <p:transition spd="slow"/>
+    </mc:Fallback>
+  </mc:AlternateContent>
+</p:sld>
+</file>
+
+<file path=ppt/slides/slide2.xml><?xml version="1.0" encoding="utf-8"?>
+<p:sld xmlns:a="http://schemas.openxmlformats.org/drawingml/2006/main" xmlns:p="http://schemas.openxmlformats.org/presentationml/2006/main" xmlns:r="http://schemas.openxmlformats.org/officeDocument/2006/relationships" xmlns:p14="http://schemas.microsoft.com/office/powerpoint/2010/main" xmlns:p15="http://schemas.microsoft.com/office/powerpoint/2012/main" xmlns:mc="http://schemas.openxmlformats.org/markup-compatibility/2006">
+  <p:cSld>
+    <p:bg>
+      <p:bgPr>
+        <a:solidFill>
+          <a:srgbClr val="000000"/>
+        </a:solidFill>
+      </p:bgPr>
+    </p:bg>
+    <p:spTree>
+      <p:nvGrpSpPr>
+        <p:cNvPr id="1" name=""/>
+        <p:cNvGrpSpPr/>
+        <p:nvPr/>
+      </p:nvGrpSpPr>
+      <p:grpSpPr>
+        <a:xfrm>
+          <a:off x="0" y="0"/>
+          <a:ext cx="0" cy="0"/>
+          <a:chOff x="0" y="0"/>
+          <a:chExt cx="0" cy="0"/>
+        </a:xfrm>
+      </p:grpSpPr>
+      <p:pic>
+        <p:nvPicPr>
+          <p:cNvPr id="42" name="" descr=""/>
+          <p:cNvPicPr/>
+          <p:nvPr/>
+        </p:nvPicPr>
+        <p:blipFill>
+          <a:blip r:embed="rId1"/>
+          <a:stretch/>
+        </p:blipFill>
+        <p:spPr>
+          <a:xfrm>
+            <a:off x="1445400" y="0"/>
+            <a:ext cx="8634600" cy="5669640"/>
+          </a:xfrm>
+          <a:prstGeom prst="rect">
+            <a:avLst/>
+          </a:prstGeom>
+          <a:ln w="0">
+            <a:noFill/>
+          </a:ln>
+        </p:spPr>
+      </p:pic>
+      <p:sp>
+        <p:nvSpPr>
+          <p:cNvPr id="43" name=""/>
+          <p:cNvSpPr txBox="1"/>
+          <p:nvPr/>
+        </p:nvSpPr>
+        <p:spPr>
+          <a:xfrm>
+            <a:off x="228600" y="714600"/>
+            <a:ext cx="1032480" cy="1416960"/>
+          </a:xfrm>
+          <a:prstGeom prst="rect">
+            <a:avLst/>
+          </a:prstGeom>
+          <a:noFill/>
+          <a:ln w="0">
+            <a:noFill/>
+          </a:ln>
+        </p:spPr>
+        <p:txBody>
+          <a:bodyPr lIns="90000" rIns="90000" tIns="45000" bIns="45000" anchor="t">
+            <a:noAutofit/>
+          </a:bodyPr>
+          <a:p>
+            <a:r>
+              <a:rPr b="0" lang="en-US" sz="1800" spc="-1" strike="noStrike">
+                <a:solidFill>
+                  <a:srgbClr val="ffffff"/>
+                </a:solidFill>
+                <a:latin typeface="Bitstream Vera Sans"/>
+              </a:rPr>
+              <a:t>NEW</a:t>
+            </a:r>
+            <a:endParaRPr b="0" lang="en-US" sz="1800" spc="-1" strike="noStrike">
+              <a:solidFill>
+                <a:srgbClr val="ffffff"/>
+              </a:solidFill>
+              <a:latin typeface="Bitstream Vera Sans"/>
+            </a:endParaRPr>
+          </a:p>
+          <a:p>
+            <a:endParaRPr b="0" lang="en-US" sz="1800" spc="-1" strike="noStrike">
+              <a:solidFill>
+                <a:srgbClr val="ffffff"/>
+              </a:solidFill>
+              <a:latin typeface="Bitstream Vera Sans"/>
+            </a:endParaRPr>
+          </a:p>
+          <a:p>
+            <a:r>
+              <a:rPr b="0" lang="en-US" sz="1800" spc="-1" strike="noStrike">
+                <a:solidFill>
+                  <a:srgbClr val="ffffff"/>
+                </a:solidFill>
+                <a:latin typeface="Bitstream Vera Sans"/>
+              </a:rPr>
+              <a:t>REV</a:t>
+            </a:r>
+            <a:endParaRPr b="0" lang="en-US" sz="1800" spc="-1" strike="noStrike">
+              <a:solidFill>
+                <a:srgbClr val="ffffff"/>
+              </a:solidFill>
+              <a:latin typeface="Bitstream Vera Sans"/>
+            </a:endParaRPr>
+          </a:p>
+          <a:p>
+            <a:r>
+              <a:rPr b="0" lang="en-US" sz="1800" spc="-1" strike="noStrike">
+                <a:solidFill>
+                  <a:srgbClr val="ffffff"/>
+                </a:solidFill>
+                <a:latin typeface="Bitstream Vera Sans"/>
+              </a:rPr>
+              <a:t>Control</a:t>
+            </a:r>
+            <a:endParaRPr b="0" lang="en-US" sz="1800" spc="-1" strike="noStrike">
+              <a:solidFill>
+                <a:srgbClr val="ffffff"/>
+              </a:solidFill>
+              <a:latin typeface="Bitstream Vera Sans"/>
+            </a:endParaRPr>
+          </a:p>
+          <a:p>
+            <a:r>
+              <a:rPr b="0" lang="en-US" sz="1800" spc="-1" strike="noStrike">
+                <a:solidFill>
+                  <a:srgbClr val="ffffff"/>
+                </a:solidFill>
+                <a:latin typeface="Bitstream Vera Sans"/>
+              </a:rPr>
+              <a:t>System</a:t>
+            </a:r>
+            <a:endParaRPr b="0" lang="en-US" sz="1800" spc="-1" strike="noStrike">
+              <a:solidFill>
+                <a:srgbClr val="ffffff"/>
+              </a:solidFill>
+              <a:latin typeface="Bitstream Vera Sans"/>
+            </a:endParaRPr>
+          </a:p>
+        </p:txBody>
+      </p:sp>
+    </p:spTree>
+  </p:cSld>
+  <mc:AlternateContent>
+    <mc:Choice Requires="p14">
+      <p:transition spd="slow" p14:dur="2000"/>
+    </mc:Choice>
+    <mc:Fallback>
+      <p:transition spd="slow"/>
+    </mc:Fallback>
+  </mc:AlternateContent>
+</p:sld>
+</file>
+
+<file path=ppt/slides/slide3.xml><?xml version="1.0" encoding="utf-8"?>
+<p:sld xmlns:a="http://schemas.openxmlformats.org/drawingml/2006/main" xmlns:p="http://schemas.openxmlformats.org/presentationml/2006/main" xmlns:r="http://schemas.openxmlformats.org/officeDocument/2006/relationships" xmlns:p14="http://schemas.microsoft.com/office/powerpoint/2010/main" xmlns:p15="http://schemas.microsoft.com/office/powerpoint/2012/main" xmlns:mc="http://schemas.openxmlformats.org/markup-compatibility/2006">
+  <p:cSld>
+    <p:bg>
+      <p:bgPr>
+        <a:solidFill>
+          <a:srgbClr val="000000"/>
+        </a:solidFill>
+      </p:bgPr>
+    </p:bg>
+    <p:spTree>
+      <p:nvGrpSpPr>
+        <p:cNvPr id="1" name=""/>
+        <p:cNvGrpSpPr/>
+        <p:nvPr/>
+      </p:nvGrpSpPr>
+      <p:grpSpPr>
+        <a:xfrm>
+          <a:off x="0" y="0"/>
+          <a:ext cx="0" cy="0"/>
+          <a:chOff x="0" y="0"/>
+          <a:chExt cx="0" cy="0"/>
+        </a:xfrm>
+      </p:grpSpPr>
+      <p:sp>
+        <p:nvSpPr>
+          <p:cNvPr id="44" name=""/>
+          <p:cNvSpPr txBox="1"/>
+          <p:nvPr/>
+        </p:nvSpPr>
+        <p:spPr>
+          <a:xfrm>
+            <a:off x="228600" y="714600"/>
+            <a:ext cx="1076760" cy="1416960"/>
+          </a:xfrm>
+          <a:prstGeom prst="rect">
+            <a:avLst/>
+          </a:prstGeom>
+          <a:noFill/>
+          <a:ln w="0">
+            <a:noFill/>
+          </a:ln>
+        </p:spPr>
+        <p:txBody>
+          <a:bodyPr lIns="90000" rIns="90000" tIns="45000" bIns="45000" anchor="t">
+            <a:noAutofit/>
+          </a:bodyPr>
+          <a:p>
+            <a:r>
+              <a:rPr b="0" lang="en-US" sz="1800" spc="-1" strike="noStrike">
+                <a:solidFill>
+                  <a:srgbClr val="ffffff"/>
+                </a:solidFill>
+                <a:latin typeface="Bitstream Vera Sans"/>
+              </a:rPr>
+              <a:t>LEGACY</a:t>
+            </a:r>
+            <a:endParaRPr b="0" lang="en-US" sz="1800" spc="-1" strike="noStrike">
+              <a:solidFill>
+                <a:srgbClr val="ffffff"/>
+              </a:solidFill>
+              <a:latin typeface="Bitstream Vera Sans"/>
+            </a:endParaRPr>
+          </a:p>
+          <a:p>
+            <a:endParaRPr b="0" lang="en-US" sz="1800" spc="-1" strike="noStrike">
+              <a:solidFill>
+                <a:srgbClr val="ffffff"/>
+              </a:solidFill>
+              <a:latin typeface="Bitstream Vera Sans"/>
+            </a:endParaRPr>
+          </a:p>
+          <a:p>
+            <a:r>
+              <a:rPr b="0" lang="en-US" sz="1800" spc="-1" strike="noStrike">
+                <a:solidFill>
+                  <a:srgbClr val="ffffff"/>
+                </a:solidFill>
+                <a:latin typeface="Bitstream Vera Sans"/>
+              </a:rPr>
+              <a:t>CTRE</a:t>
+            </a:r>
+            <a:endParaRPr b="0" lang="en-US" sz="1800" spc="-1" strike="noStrike">
+              <a:solidFill>
+                <a:srgbClr val="ffffff"/>
+              </a:solidFill>
+              <a:latin typeface="Bitstream Vera Sans"/>
+            </a:endParaRPr>
+          </a:p>
+          <a:p>
+            <a:r>
+              <a:rPr b="0" lang="en-US" sz="1800" spc="-1" strike="noStrike">
+                <a:solidFill>
+                  <a:srgbClr val="ffffff"/>
+                </a:solidFill>
+                <a:latin typeface="Bitstream Vera Sans"/>
+              </a:rPr>
+              <a:t>Control</a:t>
+            </a:r>
+            <a:endParaRPr b="0" lang="en-US" sz="1800" spc="-1" strike="noStrike">
+              <a:solidFill>
+                <a:srgbClr val="ffffff"/>
+              </a:solidFill>
+              <a:latin typeface="Bitstream Vera Sans"/>
+            </a:endParaRPr>
+          </a:p>
+          <a:p>
+            <a:r>
+              <a:rPr b="0" lang="en-US" sz="1800" spc="-1" strike="noStrike">
+                <a:solidFill>
+                  <a:srgbClr val="ffffff"/>
+                </a:solidFill>
+                <a:latin typeface="Bitstream Vera Sans"/>
+              </a:rPr>
+              <a:t>System</a:t>
+            </a:r>
+            <a:endParaRPr b="0" lang="en-US" sz="1800" spc="-1" strike="noStrike">
+              <a:solidFill>
+                <a:srgbClr val="ffffff"/>
+              </a:solidFill>
+              <a:latin typeface="Bitstream Vera Sans"/>
+            </a:endParaRPr>
+          </a:p>
+        </p:txBody>
+      </p:sp>
+      <p:pic>
+        <p:nvPicPr>
+          <p:cNvPr id="45" name="" descr=""/>
+          <p:cNvPicPr/>
+          <p:nvPr/>
+        </p:nvPicPr>
+        <p:blipFill>
+          <a:blip r:embed="rId1"/>
+          <a:stretch/>
+        </p:blipFill>
+        <p:spPr>
+          <a:xfrm>
+            <a:off x="1940760" y="0"/>
+            <a:ext cx="8139240" cy="5669640"/>
+          </a:xfrm>
+          <a:prstGeom prst="rect">
+            <a:avLst/>
+          </a:prstGeom>
+          <a:ln w="0">
+            <a:noFill/>
+          </a:ln>
+        </p:spPr>
+      </p:pic>
+    </p:spTree>
+  </p:cSld>
+  <mc:AlternateContent>
+    <mc:Choice Requires="p14">
+      <p:transition spd="slow" p14:dur="2000"/>
+    </mc:Choice>
+    <mc:Fallback>
+      <p:transition spd="slow"/>
+    </mc:Fallback>
+  </mc:AlternateContent>
+</p:sld>
+</file>
+
+<file path=ppt/slides/slide4.xml><?xml version="1.0" encoding="utf-8"?>
+<p:sld xmlns:a="http://schemas.openxmlformats.org/drawingml/2006/main" xmlns:p="http://schemas.openxmlformats.org/presentationml/2006/main" xmlns:r="http://schemas.openxmlformats.org/officeDocument/2006/relationships" xmlns:p14="http://schemas.microsoft.com/office/powerpoint/2010/main" xmlns:p15="http://schemas.microsoft.com/office/powerpoint/2012/main" xmlns:mc="http://schemas.openxmlformats.org/markup-compatibility/2006">
+  <p:cSld>
+    <p:bg>
+      <p:bgPr>
+        <a:solidFill>
+          <a:srgbClr val="000000"/>
+        </a:solidFill>
+      </p:bgPr>
+    </p:bg>
+    <p:spTree>
+      <p:nvGrpSpPr>
+        <p:cNvPr id="1" name=""/>
+        <p:cNvGrpSpPr/>
+        <p:nvPr/>
+      </p:nvGrpSpPr>
+      <p:grpSpPr>
+        <a:xfrm>
+          <a:off x="0" y="0"/>
+          <a:ext cx="0" cy="0"/>
+          <a:chOff x="0" y="0"/>
+          <a:chExt cx="0" cy="0"/>
+        </a:xfrm>
+      </p:grpSpPr>
+      <p:sp>
+        <p:nvSpPr>
+          <p:cNvPr id="46" name="PlaceHolder 1"/>
+          <p:cNvSpPr>
+            <a:spLocks noGrp="1"/>
+          </p:cNvSpPr>
+          <p:nvPr>
+            <p:ph type="title"/>
+          </p:nvPr>
+        </p:nvSpPr>
+        <p:spPr>
+          <a:xfrm>
+            <a:off x="504000" y="226080"/>
+            <a:ext cx="9071640" cy="946440"/>
+          </a:xfrm>
+          <a:prstGeom prst="rect">
+            <a:avLst/>
+          </a:prstGeom>
+          <a:noFill/>
+          <a:ln w="0">
+            <a:noFill/>
+          </a:ln>
+        </p:spPr>
+        <p:txBody>
+          <a:bodyPr lIns="0" rIns="0" tIns="0" bIns="0" anchor="ctr">
+            <a:noAutofit/>
+          </a:bodyPr>
+          <a:p>
+            <a:pPr indent="0">
+              <a:buNone/>
+            </a:pPr>
+            <a:r>
+              <a:rPr b="0" lang="en-US" sz="4400" spc="-1" strike="noStrike">
+                <a:solidFill>
+                  <a:srgbClr val="ffffff"/>
+                </a:solidFill>
+                <a:latin typeface="Bitstream Vera Sans"/>
+              </a:rPr>
+              <a:t>Notes</a:t>
+            </a:r>
+            <a:endParaRPr b="0" lang="en-US" sz="4400" spc="-1" strike="noStrike">
+              <a:solidFill>
+                <a:srgbClr val="ffffff"/>
+              </a:solidFill>
+              <a:latin typeface="Bitstream Vera Sans"/>
+            </a:endParaRPr>
+          </a:p>
+        </p:txBody>
+      </p:sp>
+      <p:sp>
+        <p:nvSpPr>
+          <p:cNvPr id="47" name="PlaceHolder 2"/>
+          <p:cNvSpPr>
+            <a:spLocks noGrp="1"/>
+          </p:cNvSpPr>
+          <p:nvPr>
+            <p:ph type="subTitle"/>
+          </p:nvPr>
+        </p:nvSpPr>
+        <p:spPr>
+          <a:xfrm>
             <a:off x="504000" y="1326600"/>
             <a:ext cx="9071640" cy="3288240"/>
           </a:xfrm>
@@ -3057,11 +3516,18 @@
           </a:ln>
         </p:spPr>
         <p:txBody>
-          <a:bodyPr lIns="0" rIns="0" tIns="0" bIns="0" anchor="ctr">
+          <a:bodyPr lIns="0" rIns="0" tIns="0" bIns="0" anchor="t">
             <a:noAutofit/>
           </a:bodyPr>
           <a:p>
-            <a:pPr algn="ctr"/>
+            <a:pPr marL="216000" indent="-216000">
+              <a:buClr>
+                <a:srgbClr val="ffffff"/>
+              </a:buClr>
+              <a:buSzPct val="45000"/>
+              <a:buFont typeface="Wingdings" charset="2"/>
+              <a:buChar char=""/>
+            </a:pPr>
             <a:r>
               <a:rPr b="0" lang="en-US" sz="3200" spc="-1" strike="noStrike">
                 <a:solidFill>
@@ -3069,13 +3535,321 @@
                 </a:solidFill>
                 <a:latin typeface="Arial"/>
               </a:rPr>
-              <a:t>FRC Control System</a:t>
+              <a:t>PoE &amp; Direct Power Redundancy</a:t>
             </a:r>
             <a:endParaRPr b="0" lang="en-US" sz="3200" spc="-1" strike="noStrike">
               <a:solidFill>
                 <a:srgbClr val="ffffff"/>
               </a:solidFill>
               <a:latin typeface="Arial"/>
+            </a:endParaRPr>
+          </a:p>
+          <a:p>
+            <a:pPr marL="216000" indent="-216000">
+              <a:buClr>
+                <a:srgbClr val="ffffff"/>
+              </a:buClr>
+              <a:buSzPct val="45000"/>
+              <a:buFont typeface="Wingdings" charset="2"/>
+              <a:buChar char=""/>
+            </a:pPr>
+            <a:r>
+              <a:rPr b="0" lang="en-US" sz="3200" spc="-1" strike="noStrike">
+                <a:solidFill>
+                  <a:srgbClr val="ffffff"/>
+                </a:solidFill>
+                <a:latin typeface="Arial"/>
+              </a:rPr>
+              <a:t>CAN Start/Stop (Integrated 120 </a:t>
+            </a:r>
+            <a:r>
+              <a:rPr b="0" lang="en-US" sz="3200" spc="-1" strike="noStrike">
+                <a:solidFill>
+                  <a:srgbClr val="ffffff"/>
+                </a:solidFill>
+                <a:latin typeface="Times New Roman"/>
+                <a:ea typeface="Times New Roman"/>
+              </a:rPr>
+              <a:t>Ω</a:t>
+            </a:r>
+            <a:r>
+              <a:rPr b="0" lang="en-US" sz="3200" spc="-1" strike="noStrike">
+                <a:solidFill>
+                  <a:srgbClr val="ffffff"/>
+                </a:solidFill>
+                <a:latin typeface="Arial"/>
+                <a:ea typeface="Times New Roman"/>
+              </a:rPr>
+              <a:t>)</a:t>
+            </a:r>
+            <a:endParaRPr b="0" lang="en-US" sz="3200" spc="-1" strike="noStrike">
+              <a:solidFill>
+                <a:srgbClr val="ffffff"/>
+              </a:solidFill>
+              <a:latin typeface="Arial"/>
+            </a:endParaRPr>
+          </a:p>
+          <a:p>
+            <a:pPr marL="216000" indent="-216000">
+              <a:buClr>
+                <a:srgbClr val="ffffff"/>
+              </a:buClr>
+              <a:buSzPct val="45000"/>
+              <a:buFont typeface="Wingdings" charset="2"/>
+              <a:buChar char=""/>
+            </a:pPr>
+            <a:r>
+              <a:rPr b="0" lang="en-US" sz="3200" spc="-1" strike="noStrike">
+                <a:solidFill>
+                  <a:srgbClr val="ffffff"/>
+                </a:solidFill>
+                <a:latin typeface="Arial"/>
+                <a:ea typeface="Times New Roman"/>
+              </a:rPr>
+              <a:t>Ethernet Switch</a:t>
+            </a:r>
+            <a:endParaRPr b="0" lang="en-US" sz="3200" spc="-1" strike="noStrike">
+              <a:solidFill>
+                <a:srgbClr val="ffffff"/>
+              </a:solidFill>
+              <a:latin typeface="Arial"/>
+            </a:endParaRPr>
+          </a:p>
+          <a:p>
+            <a:pPr lvl="1" marL="432000" indent="-216000">
+              <a:buClr>
+                <a:srgbClr val="ffffff"/>
+              </a:buClr>
+              <a:buSzPct val="45000"/>
+              <a:buFont typeface="Wingdings" charset="2"/>
+              <a:buChar char=""/>
+            </a:pPr>
+            <a:r>
+              <a:rPr b="0" lang="en-US" sz="3200" spc="-1" strike="noStrike">
+                <a:solidFill>
+                  <a:srgbClr val="ffffff"/>
+                </a:solidFill>
+                <a:latin typeface="Arial"/>
+                <a:ea typeface="Times New Roman"/>
+              </a:rPr>
+              <a:t>RPi, etc.</a:t>
+            </a:r>
+            <a:r>
+              <a:rPr b="0" lang="en-US" sz="3200" spc="-1" strike="noStrike">
+                <a:solidFill>
+                  <a:srgbClr val="ffffff"/>
+                </a:solidFill>
+                <a:latin typeface="Arial"/>
+              </a:rPr>
+              <a:t> </a:t>
+            </a:r>
+            <a:endParaRPr b="0" lang="en-US" sz="3200" spc="-1" strike="noStrike">
+              <a:solidFill>
+                <a:srgbClr val="ffffff"/>
+              </a:solidFill>
+              <a:latin typeface="Arial"/>
+            </a:endParaRPr>
+          </a:p>
+        </p:txBody>
+      </p:sp>
+    </p:spTree>
+  </p:cSld>
+  <mc:AlternateContent>
+    <mc:Choice Requires="p14">
+      <p:transition spd="slow" p14:dur="2000"/>
+    </mc:Choice>
+    <mc:Fallback>
+      <p:transition spd="slow"/>
+    </mc:Fallback>
+  </mc:AlternateContent>
+</p:sld>
+</file>
+
+<file path=ppt/slides/slide5.xml><?xml version="1.0" encoding="utf-8"?>
+<p:sld xmlns:a="http://schemas.openxmlformats.org/drawingml/2006/main" xmlns:p="http://schemas.openxmlformats.org/presentationml/2006/main" xmlns:r="http://schemas.openxmlformats.org/officeDocument/2006/relationships" xmlns:p14="http://schemas.microsoft.com/office/powerpoint/2010/main" xmlns:p15="http://schemas.microsoft.com/office/powerpoint/2012/main" xmlns:mc="http://schemas.openxmlformats.org/markup-compatibility/2006">
+  <p:cSld>
+    <p:bg>
+      <p:bgPr>
+        <a:solidFill>
+          <a:srgbClr val="000000"/>
+        </a:solidFill>
+      </p:bgPr>
+    </p:bg>
+    <p:spTree>
+      <p:nvGrpSpPr>
+        <p:cNvPr id="1" name=""/>
+        <p:cNvGrpSpPr/>
+        <p:nvPr/>
+      </p:nvGrpSpPr>
+      <p:grpSpPr>
+        <a:xfrm>
+          <a:off x="0" y="0"/>
+          <a:ext cx="0" cy="0"/>
+          <a:chOff x="0" y="0"/>
+          <a:chExt cx="0" cy="0"/>
+        </a:xfrm>
+      </p:grpSpPr>
+      <p:pic>
+        <p:nvPicPr>
+          <p:cNvPr id="48" name="" descr=""/>
+          <p:cNvPicPr/>
+          <p:nvPr/>
+        </p:nvPicPr>
+        <p:blipFill>
+          <a:blip r:embed="rId1"/>
+          <a:srcRect l="0" t="0" r="36931" b="0"/>
+          <a:stretch/>
+        </p:blipFill>
+        <p:spPr>
+          <a:xfrm>
+            <a:off x="4186800" y="1371600"/>
+            <a:ext cx="5871240" cy="3657600"/>
+          </a:xfrm>
+          <a:prstGeom prst="rect">
+            <a:avLst/>
+          </a:prstGeom>
+          <a:ln w="0">
+            <a:noFill/>
+          </a:ln>
+        </p:spPr>
+      </p:pic>
+      <p:sp>
+        <p:nvSpPr>
+          <p:cNvPr id="49" name="PlaceHolder 1"/>
+          <p:cNvSpPr>
+            <a:spLocks noGrp="1"/>
+          </p:cNvSpPr>
+          <p:nvPr>
+            <p:ph type="title"/>
+          </p:nvPr>
+        </p:nvSpPr>
+        <p:spPr>
+          <a:xfrm>
+            <a:off x="504000" y="226080"/>
+            <a:ext cx="9071640" cy="946440"/>
+          </a:xfrm>
+          <a:prstGeom prst="rect">
+            <a:avLst/>
+          </a:prstGeom>
+          <a:noFill/>
+          <a:ln w="0">
+            <a:noFill/>
+          </a:ln>
+        </p:spPr>
+        <p:txBody>
+          <a:bodyPr lIns="0" rIns="0" tIns="0" bIns="0" anchor="ctr">
+            <a:noAutofit/>
+          </a:bodyPr>
+          <a:p>
+            <a:pPr indent="0">
+              <a:buNone/>
+            </a:pPr>
+            <a:r>
+              <a:rPr b="0" lang="en-US" sz="4400" spc="-1" strike="noStrike">
+                <a:solidFill>
+                  <a:srgbClr val="ffffff"/>
+                </a:solidFill>
+                <a:latin typeface="Bitstream Vera Sans"/>
+              </a:rPr>
+              <a:t>Networking</a:t>
+            </a:r>
+            <a:endParaRPr b="0" lang="en-US" sz="4400" spc="-1" strike="noStrike">
+              <a:solidFill>
+                <a:srgbClr val="ffffff"/>
+              </a:solidFill>
+              <a:latin typeface="Bitstream Vera Sans"/>
+            </a:endParaRPr>
+          </a:p>
+        </p:txBody>
+      </p:sp>
+      <p:sp>
+        <p:nvSpPr>
+          <p:cNvPr id="50" name=""/>
+          <p:cNvSpPr txBox="1"/>
+          <p:nvPr/>
+        </p:nvSpPr>
+        <p:spPr>
+          <a:xfrm>
+            <a:off x="457200" y="1600200"/>
+            <a:ext cx="3657600" cy="2478240"/>
+          </a:xfrm>
+          <a:prstGeom prst="rect">
+            <a:avLst/>
+          </a:prstGeom>
+          <a:noFill/>
+          <a:ln w="0">
+            <a:noFill/>
+          </a:ln>
+        </p:spPr>
+        <p:txBody>
+          <a:bodyPr lIns="90000" rIns="90000" tIns="45000" bIns="45000" anchor="t">
+            <a:noAutofit/>
+          </a:bodyPr>
+          <a:p>
+            <a:r>
+              <a:rPr b="0" lang="en-US" sz="1800" spc="-1" strike="noStrike">
+                <a:solidFill>
+                  <a:srgbClr val="ffffff"/>
+                </a:solidFill>
+                <a:latin typeface="Bitstream Vera Sans"/>
+              </a:rPr>
+              <a:t>Make Your Life Easier:</a:t>
+            </a:r>
+            <a:endParaRPr b="0" lang="en-US" sz="1800" spc="-1" strike="noStrike">
+              <a:solidFill>
+                <a:srgbClr val="ffffff"/>
+              </a:solidFill>
+              <a:latin typeface="Bitstream Vera Sans"/>
+            </a:endParaRPr>
+          </a:p>
+          <a:p>
+            <a:endParaRPr b="0" lang="en-US" sz="1800" spc="-1" strike="noStrike">
+              <a:solidFill>
+                <a:srgbClr val="ffffff"/>
+              </a:solidFill>
+              <a:latin typeface="Bitstream Vera Sans"/>
+            </a:endParaRPr>
+          </a:p>
+          <a:p>
+            <a:r>
+              <a:rPr b="0" lang="en-US" sz="1800" spc="-1" strike="noStrike">
+                <a:solidFill>
+                  <a:srgbClr val="ffffff"/>
+                </a:solidFill>
+                <a:latin typeface="Bitstream Vera Sans"/>
+              </a:rPr>
+              <a:t>Have a separate radio with the FMS image (for competition)</a:t>
+            </a:r>
+            <a:endParaRPr b="0" lang="en-US" sz="1800" spc="-1" strike="noStrike">
+              <a:solidFill>
+                <a:srgbClr val="ffffff"/>
+              </a:solidFill>
+              <a:latin typeface="Bitstream Vera Sans"/>
+            </a:endParaRPr>
+          </a:p>
+          <a:p>
+            <a:endParaRPr b="0" lang="en-US" sz="1800" spc="-1" strike="noStrike">
+              <a:solidFill>
+                <a:srgbClr val="ffffff"/>
+              </a:solidFill>
+              <a:latin typeface="Bitstream Vera Sans"/>
+            </a:endParaRPr>
+          </a:p>
+          <a:p>
+            <a:r>
+              <a:rPr b="0" lang="en-US" sz="1800" spc="-1" strike="noStrike">
+                <a:solidFill>
+                  <a:srgbClr val="ffffff"/>
+                </a:solidFill>
+                <a:latin typeface="Bitstream Vera Sans"/>
+              </a:rPr>
+              <a:t>Statically Assign IP Addresses of Additional Components (Raspberry Pi, etc.)</a:t>
+            </a:r>
+            <a:endParaRPr b="0" lang="en-US" sz="1800" spc="-1" strike="noStrike">
+              <a:solidFill>
+                <a:srgbClr val="ffffff"/>
+              </a:solidFill>
+              <a:latin typeface="Bitstream Vera Sans"/>
             </a:endParaRPr>
           </a:p>
         </p:txBody>

</xml_diff>